<commit_message>
Add new Hover effect type
</commit_message>
<xml_diff>
--- a/GUI_design.pptx
+++ b/GUI_design.pptx
@@ -14,6 +14,7 @@
     <p:sldId id="262" r:id="rId8"/>
     <p:sldId id="263" r:id="rId9"/>
     <p:sldId id="264" r:id="rId10"/>
+    <p:sldId id="265" r:id="rId11"/>
   </p:sldIdLst>
   <p:sldSz cx="12192000" cy="6858000"/>
   <p:notesSz cx="6858000" cy="9144000"/>
@@ -267,7 +268,7 @@
           <a:p>
             <a:fld id="{5F7EA7D8-EC86-40AD-BAB2-D7D0B1A5E227}" type="datetimeFigureOut">
               <a:rPr lang="zh-TW" altLang="en-US" smtClean="0"/>
-              <a:t>2025/5/28</a:t>
+              <a:t>2025/5/30</a:t>
             </a:fld>
             <a:endParaRPr lang="zh-TW" altLang="en-US"/>
           </a:p>
@@ -465,7 +466,7 @@
           <a:p>
             <a:fld id="{5F7EA7D8-EC86-40AD-BAB2-D7D0B1A5E227}" type="datetimeFigureOut">
               <a:rPr lang="zh-TW" altLang="en-US" smtClean="0"/>
-              <a:t>2025/5/28</a:t>
+              <a:t>2025/5/30</a:t>
             </a:fld>
             <a:endParaRPr lang="zh-TW" altLang="en-US"/>
           </a:p>
@@ -673,7 +674,7 @@
           <a:p>
             <a:fld id="{5F7EA7D8-EC86-40AD-BAB2-D7D0B1A5E227}" type="datetimeFigureOut">
               <a:rPr lang="zh-TW" altLang="en-US" smtClean="0"/>
-              <a:t>2025/5/28</a:t>
+              <a:t>2025/5/30</a:t>
             </a:fld>
             <a:endParaRPr lang="zh-TW" altLang="en-US"/>
           </a:p>
@@ -871,7 +872,7 @@
           <a:p>
             <a:fld id="{5F7EA7D8-EC86-40AD-BAB2-D7D0B1A5E227}" type="datetimeFigureOut">
               <a:rPr lang="zh-TW" altLang="en-US" smtClean="0"/>
-              <a:t>2025/5/28</a:t>
+              <a:t>2025/5/30</a:t>
             </a:fld>
             <a:endParaRPr lang="zh-TW" altLang="en-US"/>
           </a:p>
@@ -1146,7 +1147,7 @@
           <a:p>
             <a:fld id="{5F7EA7D8-EC86-40AD-BAB2-D7D0B1A5E227}" type="datetimeFigureOut">
               <a:rPr lang="zh-TW" altLang="en-US" smtClean="0"/>
-              <a:t>2025/5/28</a:t>
+              <a:t>2025/5/30</a:t>
             </a:fld>
             <a:endParaRPr lang="zh-TW" altLang="en-US"/>
           </a:p>
@@ -1411,7 +1412,7 @@
           <a:p>
             <a:fld id="{5F7EA7D8-EC86-40AD-BAB2-D7D0B1A5E227}" type="datetimeFigureOut">
               <a:rPr lang="zh-TW" altLang="en-US" smtClean="0"/>
-              <a:t>2025/5/28</a:t>
+              <a:t>2025/5/30</a:t>
             </a:fld>
             <a:endParaRPr lang="zh-TW" altLang="en-US"/>
           </a:p>
@@ -1823,7 +1824,7 @@
           <a:p>
             <a:fld id="{5F7EA7D8-EC86-40AD-BAB2-D7D0B1A5E227}" type="datetimeFigureOut">
               <a:rPr lang="zh-TW" altLang="en-US" smtClean="0"/>
-              <a:t>2025/5/28</a:t>
+              <a:t>2025/5/30</a:t>
             </a:fld>
             <a:endParaRPr lang="zh-TW" altLang="en-US"/>
           </a:p>
@@ -1964,7 +1965,7 @@
           <a:p>
             <a:fld id="{5F7EA7D8-EC86-40AD-BAB2-D7D0B1A5E227}" type="datetimeFigureOut">
               <a:rPr lang="zh-TW" altLang="en-US" smtClean="0"/>
-              <a:t>2025/5/28</a:t>
+              <a:t>2025/5/30</a:t>
             </a:fld>
             <a:endParaRPr lang="zh-TW" altLang="en-US"/>
           </a:p>
@@ -2077,7 +2078,7 @@
           <a:p>
             <a:fld id="{5F7EA7D8-EC86-40AD-BAB2-D7D0B1A5E227}" type="datetimeFigureOut">
               <a:rPr lang="zh-TW" altLang="en-US" smtClean="0"/>
-              <a:t>2025/5/28</a:t>
+              <a:t>2025/5/30</a:t>
             </a:fld>
             <a:endParaRPr lang="zh-TW" altLang="en-US"/>
           </a:p>
@@ -2388,7 +2389,7 @@
           <a:p>
             <a:fld id="{5F7EA7D8-EC86-40AD-BAB2-D7D0B1A5E227}" type="datetimeFigureOut">
               <a:rPr lang="zh-TW" altLang="en-US" smtClean="0"/>
-              <a:t>2025/5/28</a:t>
+              <a:t>2025/5/30</a:t>
             </a:fld>
             <a:endParaRPr lang="zh-TW" altLang="en-US"/>
           </a:p>
@@ -2676,7 +2677,7 @@
           <a:p>
             <a:fld id="{5F7EA7D8-EC86-40AD-BAB2-D7D0B1A5E227}" type="datetimeFigureOut">
               <a:rPr lang="zh-TW" altLang="en-US" smtClean="0"/>
-              <a:t>2025/5/28</a:t>
+              <a:t>2025/5/30</a:t>
             </a:fld>
             <a:endParaRPr lang="zh-TW" altLang="en-US"/>
           </a:p>
@@ -2917,7 +2918,7 @@
           <a:p>
             <a:fld id="{5F7EA7D8-EC86-40AD-BAB2-D7D0B1A5E227}" type="datetimeFigureOut">
               <a:rPr lang="zh-TW" altLang="en-US" smtClean="0"/>
-              <a:t>2025/5/28</a:t>
+              <a:t>2025/5/30</a:t>
             </a:fld>
             <a:endParaRPr lang="zh-TW" altLang="en-US"/>
           </a:p>
@@ -8209,6 +8210,1331 @@
 </p:sld>
 </file>
 
+<file path=ppt/slides/slide10.xml><?xml version="1.0" encoding="utf-8"?>
+<p:sld xmlns:a="http://schemas.openxmlformats.org/drawingml/2006/main" xmlns:r="http://schemas.openxmlformats.org/officeDocument/2006/relationships" xmlns:p="http://schemas.openxmlformats.org/presentationml/2006/main">
+  <p:cSld>
+    <p:spTree>
+      <p:nvGrpSpPr>
+        <p:cNvPr id="1" name="">
+          <a:extLst>
+            <a:ext uri="{FF2B5EF4-FFF2-40B4-BE49-F238E27FC236}">
+              <a16:creationId xmlns:a16="http://schemas.microsoft.com/office/drawing/2014/main" id="{5D326D78-1BA8-2ABE-0621-341A6FBAD9AE}"/>
+            </a:ext>
+          </a:extLst>
+        </p:cNvPr>
+        <p:cNvGrpSpPr/>
+        <p:nvPr/>
+      </p:nvGrpSpPr>
+      <p:grpSpPr>
+        <a:xfrm>
+          <a:off x="0" y="0"/>
+          <a:ext cx="0" cy="0"/>
+          <a:chOff x="0" y="0"/>
+          <a:chExt cx="0" cy="0"/>
+        </a:xfrm>
+      </p:grpSpPr>
+      <p:sp>
+        <p:nvSpPr>
+          <p:cNvPr id="8" name="矩形: 圓角 7">
+            <a:extLst>
+              <a:ext uri="{FF2B5EF4-FFF2-40B4-BE49-F238E27FC236}">
+                <a16:creationId xmlns:a16="http://schemas.microsoft.com/office/drawing/2014/main" id="{A7028EA3-9EF7-99CF-16D8-DE86058D189E}"/>
+              </a:ext>
+            </a:extLst>
+          </p:cNvPr>
+          <p:cNvSpPr/>
+          <p:nvPr/>
+        </p:nvSpPr>
+        <p:spPr>
+          <a:xfrm>
+            <a:off x="2810991" y="905746"/>
+            <a:ext cx="1943100" cy="251944"/>
+          </a:xfrm>
+          <a:prstGeom prst="roundRect">
+            <a:avLst>
+              <a:gd name="adj" fmla="val 50000"/>
+            </a:avLst>
+          </a:prstGeom>
+          <a:solidFill>
+            <a:srgbClr val="EEB277"/>
+          </a:solidFill>
+          <a:ln w="12700">
+            <a:solidFill>
+              <a:srgbClr val="F5FAFA"/>
+            </a:solidFill>
+          </a:ln>
+          <a:effectLst>
+            <a:outerShdw blurRad="50800" dist="38100" dir="2700000" algn="tl" rotWithShape="0">
+              <a:srgbClr val="7C8590">
+                <a:alpha val="40000"/>
+              </a:srgbClr>
+            </a:outerShdw>
+          </a:effectLst>
+        </p:spPr>
+        <p:style>
+          <a:lnRef idx="2">
+            <a:schemeClr val="accent1">
+              <a:shade val="15000"/>
+            </a:schemeClr>
+          </a:lnRef>
+          <a:fillRef idx="1">
+            <a:schemeClr val="accent1"/>
+          </a:fillRef>
+          <a:effectRef idx="0">
+            <a:schemeClr val="accent1"/>
+          </a:effectRef>
+          <a:fontRef idx="minor">
+            <a:schemeClr val="lt1"/>
+          </a:fontRef>
+        </p:style>
+        <p:txBody>
+          <a:bodyPr rtlCol="0" anchor="ctr"/>
+          <a:lstStyle/>
+          <a:p>
+            <a:pPr algn="ctr"/>
+            <a:endParaRPr lang="zh-TW" altLang="en-US" dirty="0"/>
+          </a:p>
+        </p:txBody>
+      </p:sp>
+      <p:sp>
+        <p:nvSpPr>
+          <p:cNvPr id="9" name="矩形: 圓角 8">
+            <a:extLst>
+              <a:ext uri="{FF2B5EF4-FFF2-40B4-BE49-F238E27FC236}">
+                <a16:creationId xmlns:a16="http://schemas.microsoft.com/office/drawing/2014/main" id="{FE984144-ABFB-0D5D-DEB2-54FA187C505D}"/>
+              </a:ext>
+            </a:extLst>
+          </p:cNvPr>
+          <p:cNvSpPr/>
+          <p:nvPr/>
+        </p:nvSpPr>
+        <p:spPr>
+          <a:xfrm>
+            <a:off x="3165341" y="3451987"/>
+            <a:ext cx="1234400" cy="294640"/>
+          </a:xfrm>
+          <a:prstGeom prst="roundRect">
+            <a:avLst>
+              <a:gd name="adj" fmla="val 50000"/>
+            </a:avLst>
+          </a:prstGeom>
+          <a:solidFill>
+            <a:srgbClr val="A9BFDB"/>
+          </a:solidFill>
+          <a:ln>
+            <a:solidFill>
+              <a:srgbClr val="BBCDE2"/>
+            </a:solidFill>
+          </a:ln>
+          <a:effectLst>
+            <a:outerShdw blurRad="76200" dist="38100" dir="2700000" algn="tl" rotWithShape="0">
+              <a:srgbClr val="A9BFDB"/>
+            </a:outerShdw>
+          </a:effectLst>
+        </p:spPr>
+        <p:style>
+          <a:lnRef idx="2">
+            <a:schemeClr val="accent1">
+              <a:shade val="15000"/>
+            </a:schemeClr>
+          </a:lnRef>
+          <a:fillRef idx="1">
+            <a:schemeClr val="accent1"/>
+          </a:fillRef>
+          <a:effectRef idx="0">
+            <a:schemeClr val="accent1"/>
+          </a:effectRef>
+          <a:fontRef idx="minor">
+            <a:schemeClr val="lt1"/>
+          </a:fontRef>
+        </p:style>
+        <p:txBody>
+          <a:bodyPr rtlCol="0" anchor="ctr"/>
+          <a:lstStyle/>
+          <a:p>
+            <a:pPr algn="ctr"/>
+            <a:endParaRPr lang="zh-TW" altLang="en-US"/>
+          </a:p>
+        </p:txBody>
+      </p:sp>
+      <p:sp>
+        <p:nvSpPr>
+          <p:cNvPr id="20" name="矩形: 圓角 19">
+            <a:extLst>
+              <a:ext uri="{FF2B5EF4-FFF2-40B4-BE49-F238E27FC236}">
+                <a16:creationId xmlns:a16="http://schemas.microsoft.com/office/drawing/2014/main" id="{824BCA52-B214-8394-1066-DD9499437B2B}"/>
+              </a:ext>
+            </a:extLst>
+          </p:cNvPr>
+          <p:cNvSpPr/>
+          <p:nvPr/>
+        </p:nvSpPr>
+        <p:spPr>
+          <a:xfrm>
+            <a:off x="6576967" y="905746"/>
+            <a:ext cx="1943100" cy="251944"/>
+          </a:xfrm>
+          <a:prstGeom prst="roundRect">
+            <a:avLst>
+              <a:gd name="adj" fmla="val 50000"/>
+            </a:avLst>
+          </a:prstGeom>
+          <a:solidFill>
+            <a:srgbClr val="F0F7FA"/>
+          </a:solidFill>
+          <a:ln w="12700">
+            <a:solidFill>
+              <a:srgbClr val="F5FAFA"/>
+            </a:solidFill>
+          </a:ln>
+          <a:effectLst>
+            <a:outerShdw blurRad="50800" dist="38100" dir="2700000" algn="tl" rotWithShape="0">
+              <a:srgbClr val="7C8590">
+                <a:alpha val="40000"/>
+              </a:srgbClr>
+            </a:outerShdw>
+          </a:effectLst>
+        </p:spPr>
+        <p:style>
+          <a:lnRef idx="2">
+            <a:schemeClr val="accent1">
+              <a:shade val="15000"/>
+            </a:schemeClr>
+          </a:lnRef>
+          <a:fillRef idx="1">
+            <a:schemeClr val="accent1"/>
+          </a:fillRef>
+          <a:effectRef idx="0">
+            <a:schemeClr val="accent1"/>
+          </a:effectRef>
+          <a:fontRef idx="minor">
+            <a:schemeClr val="lt1"/>
+          </a:fontRef>
+        </p:style>
+        <p:txBody>
+          <a:bodyPr rtlCol="0" anchor="ctr"/>
+          <a:lstStyle/>
+          <a:p>
+            <a:pPr algn="ctr"/>
+            <a:endParaRPr lang="zh-TW" altLang="en-US" dirty="0"/>
+          </a:p>
+        </p:txBody>
+      </p:sp>
+      <p:sp>
+        <p:nvSpPr>
+          <p:cNvPr id="42" name="文字方塊 41">
+            <a:extLst>
+              <a:ext uri="{FF2B5EF4-FFF2-40B4-BE49-F238E27FC236}">
+                <a16:creationId xmlns:a16="http://schemas.microsoft.com/office/drawing/2014/main" id="{F0E0F0DB-CB2B-DF91-2BFD-033E12B11858}"/>
+              </a:ext>
+            </a:extLst>
+          </p:cNvPr>
+          <p:cNvSpPr txBox="1"/>
+          <p:nvPr/>
+        </p:nvSpPr>
+        <p:spPr>
+          <a:xfrm>
+            <a:off x="3188180" y="1302203"/>
+            <a:ext cx="1188722" cy="307777"/>
+          </a:xfrm>
+          <a:prstGeom prst="rect">
+            <a:avLst/>
+          </a:prstGeom>
+          <a:noFill/>
+        </p:spPr>
+        <p:txBody>
+          <a:bodyPr wrap="square" rtlCol="0">
+            <a:spAutoFit/>
+          </a:bodyPr>
+          <a:lstStyle/>
+          <a:p>
+            <a:r>
+              <a:rPr lang="en-US" altLang="zh-TW" sz="1400" dirty="0">
+                <a:latin typeface="Segoe UI" panose="020B0502040204020203" pitchFamily="34" charset="0"/>
+                <a:cs typeface="Segoe UI" panose="020B0502040204020203" pitchFamily="34" charset="0"/>
+              </a:rPr>
+              <a:t>Panel Button</a:t>
+            </a:r>
+            <a:endParaRPr lang="zh-TW" altLang="en-US" sz="1400" dirty="0">
+              <a:latin typeface="Segoe UI" panose="020B0502040204020203" pitchFamily="34" charset="0"/>
+              <a:cs typeface="Segoe UI" panose="020B0502040204020203" pitchFamily="34" charset="0"/>
+            </a:endParaRPr>
+          </a:p>
+        </p:txBody>
+      </p:sp>
+      <p:sp>
+        <p:nvSpPr>
+          <p:cNvPr id="44" name="文字方塊 43">
+            <a:extLst>
+              <a:ext uri="{FF2B5EF4-FFF2-40B4-BE49-F238E27FC236}">
+                <a16:creationId xmlns:a16="http://schemas.microsoft.com/office/drawing/2014/main" id="{DC50A29C-930C-3071-9568-EAFC3BB3F15C}"/>
+              </a:ext>
+            </a:extLst>
+          </p:cNvPr>
+          <p:cNvSpPr txBox="1"/>
+          <p:nvPr/>
+        </p:nvSpPr>
+        <p:spPr>
+          <a:xfrm>
+            <a:off x="3015230" y="3891140"/>
+            <a:ext cx="1534622" cy="307777"/>
+          </a:xfrm>
+          <a:prstGeom prst="rect">
+            <a:avLst/>
+          </a:prstGeom>
+          <a:noFill/>
+        </p:spPr>
+        <p:txBody>
+          <a:bodyPr wrap="square" rtlCol="0">
+            <a:spAutoFit/>
+          </a:bodyPr>
+          <a:lstStyle/>
+          <a:p>
+            <a:r>
+              <a:rPr lang="en-US" altLang="zh-TW" sz="1400" dirty="0">
+                <a:latin typeface="Segoe UI" panose="020B0502040204020203" pitchFamily="34" charset="0"/>
+                <a:cs typeface="Segoe UI" panose="020B0502040204020203" pitchFamily="34" charset="0"/>
+              </a:rPr>
+              <a:t>Page Turn Button</a:t>
+            </a:r>
+            <a:endParaRPr lang="zh-TW" altLang="en-US" sz="1400" dirty="0">
+              <a:latin typeface="Segoe UI" panose="020B0502040204020203" pitchFamily="34" charset="0"/>
+              <a:cs typeface="Segoe UI" panose="020B0502040204020203" pitchFamily="34" charset="0"/>
+            </a:endParaRPr>
+          </a:p>
+        </p:txBody>
+      </p:sp>
+      <p:sp>
+        <p:nvSpPr>
+          <p:cNvPr id="2" name="矩形: 圓角 1">
+            <a:extLst>
+              <a:ext uri="{FF2B5EF4-FFF2-40B4-BE49-F238E27FC236}">
+                <a16:creationId xmlns:a16="http://schemas.microsoft.com/office/drawing/2014/main" id="{8D98E5E8-3D40-3985-11C4-0B84D433C852}"/>
+              </a:ext>
+            </a:extLst>
+          </p:cNvPr>
+          <p:cNvSpPr/>
+          <p:nvPr/>
+        </p:nvSpPr>
+        <p:spPr>
+          <a:xfrm>
+            <a:off x="2810991" y="1754493"/>
+            <a:ext cx="1943100" cy="251944"/>
+          </a:xfrm>
+          <a:prstGeom prst="roundRect">
+            <a:avLst>
+              <a:gd name="adj" fmla="val 50000"/>
+            </a:avLst>
+          </a:prstGeom>
+          <a:solidFill>
+            <a:srgbClr val="F8E0C8"/>
+          </a:solidFill>
+          <a:ln w="12700">
+            <a:solidFill>
+              <a:srgbClr val="F5FAFA"/>
+            </a:solidFill>
+          </a:ln>
+          <a:effectLst>
+            <a:outerShdw blurRad="50800" dist="38100" dir="2700000" algn="tl" rotWithShape="0">
+              <a:srgbClr val="7C8590">
+                <a:alpha val="40000"/>
+              </a:srgbClr>
+            </a:outerShdw>
+          </a:effectLst>
+        </p:spPr>
+        <p:style>
+          <a:lnRef idx="2">
+            <a:schemeClr val="accent1">
+              <a:shade val="15000"/>
+            </a:schemeClr>
+          </a:lnRef>
+          <a:fillRef idx="1">
+            <a:schemeClr val="accent1"/>
+          </a:fillRef>
+          <a:effectRef idx="0">
+            <a:schemeClr val="accent1"/>
+          </a:effectRef>
+          <a:fontRef idx="minor">
+            <a:schemeClr val="lt1"/>
+          </a:fontRef>
+        </p:style>
+        <p:txBody>
+          <a:bodyPr rtlCol="0" anchor="ctr"/>
+          <a:lstStyle/>
+          <a:p>
+            <a:pPr algn="ctr"/>
+            <a:endParaRPr lang="zh-TW" altLang="en-US" dirty="0"/>
+          </a:p>
+        </p:txBody>
+      </p:sp>
+      <p:sp>
+        <p:nvSpPr>
+          <p:cNvPr id="3" name="矩形: 圓角 2">
+            <a:extLst>
+              <a:ext uri="{FF2B5EF4-FFF2-40B4-BE49-F238E27FC236}">
+                <a16:creationId xmlns:a16="http://schemas.microsoft.com/office/drawing/2014/main" id="{B8D9ADD1-B733-946A-4358-329185E00252}"/>
+              </a:ext>
+            </a:extLst>
+          </p:cNvPr>
+          <p:cNvSpPr/>
+          <p:nvPr/>
+        </p:nvSpPr>
+        <p:spPr>
+          <a:xfrm>
+            <a:off x="6576967" y="1754493"/>
+            <a:ext cx="1943100" cy="251944"/>
+          </a:xfrm>
+          <a:prstGeom prst="roundRect">
+            <a:avLst>
+              <a:gd name="adj" fmla="val 50000"/>
+            </a:avLst>
+          </a:prstGeom>
+          <a:solidFill>
+            <a:srgbClr val="C6E0EC"/>
+          </a:solidFill>
+          <a:ln w="12700">
+            <a:solidFill>
+              <a:srgbClr val="F5FAFA"/>
+            </a:solidFill>
+          </a:ln>
+          <a:effectLst>
+            <a:outerShdw blurRad="50800" dist="38100" dir="2700000" algn="tl" rotWithShape="0">
+              <a:srgbClr val="7C8590">
+                <a:alpha val="40000"/>
+              </a:srgbClr>
+            </a:outerShdw>
+          </a:effectLst>
+        </p:spPr>
+        <p:style>
+          <a:lnRef idx="2">
+            <a:schemeClr val="accent1">
+              <a:shade val="15000"/>
+            </a:schemeClr>
+          </a:lnRef>
+          <a:fillRef idx="1">
+            <a:schemeClr val="accent1"/>
+          </a:fillRef>
+          <a:effectRef idx="0">
+            <a:schemeClr val="accent1"/>
+          </a:effectRef>
+          <a:fontRef idx="minor">
+            <a:schemeClr val="lt1"/>
+          </a:fontRef>
+        </p:style>
+        <p:txBody>
+          <a:bodyPr rtlCol="0" anchor="ctr"/>
+          <a:lstStyle/>
+          <a:p>
+            <a:pPr algn="ctr"/>
+            <a:endParaRPr lang="zh-TW" altLang="en-US" dirty="0"/>
+          </a:p>
+        </p:txBody>
+      </p:sp>
+      <p:sp>
+        <p:nvSpPr>
+          <p:cNvPr id="4" name="文字方塊 3">
+            <a:extLst>
+              <a:ext uri="{FF2B5EF4-FFF2-40B4-BE49-F238E27FC236}">
+                <a16:creationId xmlns:a16="http://schemas.microsoft.com/office/drawing/2014/main" id="{FFF805CE-E8B3-19FB-D905-40725FBAB630}"/>
+              </a:ext>
+            </a:extLst>
+          </p:cNvPr>
+          <p:cNvSpPr txBox="1"/>
+          <p:nvPr/>
+        </p:nvSpPr>
+        <p:spPr>
+          <a:xfrm>
+            <a:off x="2858857" y="2150950"/>
+            <a:ext cx="1847369" cy="307777"/>
+          </a:xfrm>
+          <a:prstGeom prst="rect">
+            <a:avLst/>
+          </a:prstGeom>
+          <a:noFill/>
+        </p:spPr>
+        <p:txBody>
+          <a:bodyPr wrap="square" rtlCol="0">
+            <a:spAutoFit/>
+          </a:bodyPr>
+          <a:lstStyle/>
+          <a:p>
+            <a:r>
+              <a:rPr lang="en-US" altLang="zh-TW" sz="1400" dirty="0">
+                <a:latin typeface="Segoe UI" panose="020B0502040204020203" pitchFamily="34" charset="0"/>
+                <a:cs typeface="Segoe UI" panose="020B0502040204020203" pitchFamily="34" charset="0"/>
+              </a:rPr>
+              <a:t>Panel Button Hover</a:t>
+            </a:r>
+            <a:r>
+              <a:rPr lang="zh-TW" altLang="en-US" sz="1400" dirty="0">
+                <a:latin typeface="Segoe UI" panose="020B0502040204020203" pitchFamily="34" charset="0"/>
+                <a:cs typeface="Segoe UI" panose="020B0502040204020203" pitchFamily="34" charset="0"/>
+              </a:rPr>
+              <a:t> </a:t>
+            </a:r>
+            <a:r>
+              <a:rPr lang="en-US" altLang="zh-TW" sz="1400" dirty="0">
+                <a:latin typeface="Segoe UI" panose="020B0502040204020203" pitchFamily="34" charset="0"/>
+                <a:cs typeface="Segoe UI" panose="020B0502040204020203" pitchFamily="34" charset="0"/>
+              </a:rPr>
+              <a:t>1</a:t>
+            </a:r>
+            <a:endParaRPr lang="zh-TW" altLang="en-US" sz="1400" dirty="0">
+              <a:latin typeface="Segoe UI" panose="020B0502040204020203" pitchFamily="34" charset="0"/>
+              <a:cs typeface="Segoe UI" panose="020B0502040204020203" pitchFamily="34" charset="0"/>
+            </a:endParaRPr>
+          </a:p>
+        </p:txBody>
+      </p:sp>
+      <p:sp>
+        <p:nvSpPr>
+          <p:cNvPr id="26" name="手繪多邊形: 圖案 25">
+            <a:extLst>
+              <a:ext uri="{FF2B5EF4-FFF2-40B4-BE49-F238E27FC236}">
+                <a16:creationId xmlns:a16="http://schemas.microsoft.com/office/drawing/2014/main" id="{89358826-E1F3-32EA-7246-6F4C40605E5C}"/>
+              </a:ext>
+            </a:extLst>
+          </p:cNvPr>
+          <p:cNvSpPr/>
+          <p:nvPr/>
+        </p:nvSpPr>
+        <p:spPr>
+          <a:xfrm>
+            <a:off x="2810991" y="2603240"/>
+            <a:ext cx="1943100" cy="251944"/>
+          </a:xfrm>
+          <a:custGeom>
+            <a:avLst/>
+            <a:gdLst>
+              <a:gd name="connsiteX0" fmla="*/ 125860 w 1943100"/>
+              <a:gd name="connsiteY0" fmla="*/ 34150 h 251944"/>
+              <a:gd name="connsiteX1" fmla="*/ 34038 w 1943100"/>
+              <a:gd name="connsiteY1" fmla="*/ 125972 h 251944"/>
+              <a:gd name="connsiteX2" fmla="*/ 125860 w 1943100"/>
+              <a:gd name="connsiteY2" fmla="*/ 217794 h 251944"/>
+              <a:gd name="connsiteX3" fmla="*/ 1817240 w 1943100"/>
+              <a:gd name="connsiteY3" fmla="*/ 217794 h 251944"/>
+              <a:gd name="connsiteX4" fmla="*/ 1909062 w 1943100"/>
+              <a:gd name="connsiteY4" fmla="*/ 125972 h 251944"/>
+              <a:gd name="connsiteX5" fmla="*/ 1817240 w 1943100"/>
+              <a:gd name="connsiteY5" fmla="*/ 34150 h 251944"/>
+              <a:gd name="connsiteX6" fmla="*/ 125972 w 1943100"/>
+              <a:gd name="connsiteY6" fmla="*/ 0 h 251944"/>
+              <a:gd name="connsiteX7" fmla="*/ 1817128 w 1943100"/>
+              <a:gd name="connsiteY7" fmla="*/ 0 h 251944"/>
+              <a:gd name="connsiteX8" fmla="*/ 1943100 w 1943100"/>
+              <a:gd name="connsiteY8" fmla="*/ 125972 h 251944"/>
+              <a:gd name="connsiteX9" fmla="*/ 1817128 w 1943100"/>
+              <a:gd name="connsiteY9" fmla="*/ 251944 h 251944"/>
+              <a:gd name="connsiteX10" fmla="*/ 125972 w 1943100"/>
+              <a:gd name="connsiteY10" fmla="*/ 251944 h 251944"/>
+              <a:gd name="connsiteX11" fmla="*/ 0 w 1943100"/>
+              <a:gd name="connsiteY11" fmla="*/ 125972 h 251944"/>
+              <a:gd name="connsiteX12" fmla="*/ 125972 w 1943100"/>
+              <a:gd name="connsiteY12" fmla="*/ 0 h 251944"/>
+            </a:gdLst>
+            <a:ahLst/>
+            <a:cxnLst>
+              <a:cxn ang="0">
+                <a:pos x="connsiteX0" y="connsiteY0"/>
+              </a:cxn>
+              <a:cxn ang="0">
+                <a:pos x="connsiteX1" y="connsiteY1"/>
+              </a:cxn>
+              <a:cxn ang="0">
+                <a:pos x="connsiteX2" y="connsiteY2"/>
+              </a:cxn>
+              <a:cxn ang="0">
+                <a:pos x="connsiteX3" y="connsiteY3"/>
+              </a:cxn>
+              <a:cxn ang="0">
+                <a:pos x="connsiteX4" y="connsiteY4"/>
+              </a:cxn>
+              <a:cxn ang="0">
+                <a:pos x="connsiteX5" y="connsiteY5"/>
+              </a:cxn>
+              <a:cxn ang="0">
+                <a:pos x="connsiteX6" y="connsiteY6"/>
+              </a:cxn>
+              <a:cxn ang="0">
+                <a:pos x="connsiteX7" y="connsiteY7"/>
+              </a:cxn>
+              <a:cxn ang="0">
+                <a:pos x="connsiteX8" y="connsiteY8"/>
+              </a:cxn>
+              <a:cxn ang="0">
+                <a:pos x="connsiteX9" y="connsiteY9"/>
+              </a:cxn>
+              <a:cxn ang="0">
+                <a:pos x="connsiteX10" y="connsiteY10"/>
+              </a:cxn>
+              <a:cxn ang="0">
+                <a:pos x="connsiteX11" y="connsiteY11"/>
+              </a:cxn>
+              <a:cxn ang="0">
+                <a:pos x="connsiteX12" y="connsiteY12"/>
+              </a:cxn>
+            </a:cxnLst>
+            <a:rect l="l" t="t" r="r" b="b"/>
+            <a:pathLst>
+              <a:path w="1943100" h="251944">
+                <a:moveTo>
+                  <a:pt x="125860" y="34150"/>
+                </a:moveTo>
+                <a:cubicBezTo>
+                  <a:pt x="75148" y="34150"/>
+                  <a:pt x="34038" y="75260"/>
+                  <a:pt x="34038" y="125972"/>
+                </a:cubicBezTo>
+                <a:cubicBezTo>
+                  <a:pt x="34038" y="176684"/>
+                  <a:pt x="75148" y="217794"/>
+                  <a:pt x="125860" y="217794"/>
+                </a:cubicBezTo>
+                <a:lnTo>
+                  <a:pt x="1817240" y="217794"/>
+                </a:lnTo>
+                <a:cubicBezTo>
+                  <a:pt x="1867952" y="217794"/>
+                  <a:pt x="1909062" y="176684"/>
+                  <a:pt x="1909062" y="125972"/>
+                </a:cubicBezTo>
+                <a:cubicBezTo>
+                  <a:pt x="1909062" y="75260"/>
+                  <a:pt x="1867952" y="34150"/>
+                  <a:pt x="1817240" y="34150"/>
+                </a:cubicBezTo>
+                <a:close/>
+                <a:moveTo>
+                  <a:pt x="125972" y="0"/>
+                </a:moveTo>
+                <a:lnTo>
+                  <a:pt x="1817128" y="0"/>
+                </a:lnTo>
+                <a:cubicBezTo>
+                  <a:pt x="1886700" y="0"/>
+                  <a:pt x="1943100" y="56400"/>
+                  <a:pt x="1943100" y="125972"/>
+                </a:cubicBezTo>
+                <a:cubicBezTo>
+                  <a:pt x="1943100" y="195544"/>
+                  <a:pt x="1886700" y="251944"/>
+                  <a:pt x="1817128" y="251944"/>
+                </a:cubicBezTo>
+                <a:lnTo>
+                  <a:pt x="125972" y="251944"/>
+                </a:lnTo>
+                <a:cubicBezTo>
+                  <a:pt x="56400" y="251944"/>
+                  <a:pt x="0" y="195544"/>
+                  <a:pt x="0" y="125972"/>
+                </a:cubicBezTo>
+                <a:cubicBezTo>
+                  <a:pt x="0" y="56400"/>
+                  <a:pt x="56400" y="0"/>
+                  <a:pt x="125972" y="0"/>
+                </a:cubicBezTo>
+                <a:close/>
+              </a:path>
+            </a:pathLst>
+          </a:custGeom>
+          <a:solidFill>
+            <a:schemeClr val="tx1">
+              <a:lumMod val="65000"/>
+              <a:lumOff val="35000"/>
+            </a:schemeClr>
+          </a:solidFill>
+          <a:ln w="12700">
+            <a:noFill/>
+          </a:ln>
+          <a:effectLst>
+            <a:outerShdw blurRad="50800" dist="38100" dir="2700000" algn="tl" rotWithShape="0">
+              <a:srgbClr val="7C8590">
+                <a:alpha val="40000"/>
+              </a:srgbClr>
+            </a:outerShdw>
+          </a:effectLst>
+        </p:spPr>
+        <p:style>
+          <a:lnRef idx="2">
+            <a:schemeClr val="accent1">
+              <a:shade val="15000"/>
+            </a:schemeClr>
+          </a:lnRef>
+          <a:fillRef idx="1">
+            <a:schemeClr val="accent1"/>
+          </a:fillRef>
+          <a:effectRef idx="0">
+            <a:schemeClr val="accent1"/>
+          </a:effectRef>
+          <a:fontRef idx="minor">
+            <a:schemeClr val="lt1"/>
+          </a:fontRef>
+        </p:style>
+        <p:txBody>
+          <a:bodyPr wrap="square" rtlCol="0" anchor="ctr">
+            <a:noAutofit/>
+          </a:bodyPr>
+          <a:lstStyle/>
+          <a:p>
+            <a:pPr algn="ctr"/>
+            <a:endParaRPr lang="zh-TW" altLang="en-US" dirty="0"/>
+          </a:p>
+        </p:txBody>
+      </p:sp>
+      <p:sp>
+        <p:nvSpPr>
+          <p:cNvPr id="21" name="文字方塊 20">
+            <a:extLst>
+              <a:ext uri="{FF2B5EF4-FFF2-40B4-BE49-F238E27FC236}">
+                <a16:creationId xmlns:a16="http://schemas.microsoft.com/office/drawing/2014/main" id="{6EFB21E5-6C8A-3D15-81D0-B6C8BA0D1707}"/>
+              </a:ext>
+            </a:extLst>
+          </p:cNvPr>
+          <p:cNvSpPr txBox="1"/>
+          <p:nvPr/>
+        </p:nvSpPr>
+        <p:spPr>
+          <a:xfrm>
+            <a:off x="2858857" y="2999697"/>
+            <a:ext cx="1847369" cy="307777"/>
+          </a:xfrm>
+          <a:prstGeom prst="rect">
+            <a:avLst/>
+          </a:prstGeom>
+          <a:noFill/>
+        </p:spPr>
+        <p:txBody>
+          <a:bodyPr wrap="square" rtlCol="0">
+            <a:spAutoFit/>
+          </a:bodyPr>
+          <a:lstStyle/>
+          <a:p>
+            <a:r>
+              <a:rPr lang="en-US" altLang="zh-TW" sz="1400" dirty="0">
+                <a:latin typeface="Segoe UI" panose="020B0502040204020203" pitchFamily="34" charset="0"/>
+                <a:cs typeface="Segoe UI" panose="020B0502040204020203" pitchFamily="34" charset="0"/>
+              </a:rPr>
+              <a:t>Panel Button Hover</a:t>
+            </a:r>
+            <a:r>
+              <a:rPr lang="zh-TW" altLang="en-US" sz="1400" dirty="0">
+                <a:latin typeface="Segoe UI" panose="020B0502040204020203" pitchFamily="34" charset="0"/>
+                <a:cs typeface="Segoe UI" panose="020B0502040204020203" pitchFamily="34" charset="0"/>
+              </a:rPr>
+              <a:t> </a:t>
+            </a:r>
+            <a:r>
+              <a:rPr lang="en-US" altLang="zh-TW" sz="1400" dirty="0">
+                <a:latin typeface="Segoe UI" panose="020B0502040204020203" pitchFamily="34" charset="0"/>
+                <a:cs typeface="Segoe UI" panose="020B0502040204020203" pitchFamily="34" charset="0"/>
+              </a:rPr>
+              <a:t>2</a:t>
+            </a:r>
+            <a:endParaRPr lang="zh-TW" altLang="en-US" sz="1400" dirty="0">
+              <a:latin typeface="Segoe UI" panose="020B0502040204020203" pitchFamily="34" charset="0"/>
+              <a:cs typeface="Segoe UI" panose="020B0502040204020203" pitchFamily="34" charset="0"/>
+            </a:endParaRPr>
+          </a:p>
+        </p:txBody>
+      </p:sp>
+      <p:sp>
+        <p:nvSpPr>
+          <p:cNvPr id="40" name="手繪多邊形: 圖案 39">
+            <a:extLst>
+              <a:ext uri="{FF2B5EF4-FFF2-40B4-BE49-F238E27FC236}">
+                <a16:creationId xmlns:a16="http://schemas.microsoft.com/office/drawing/2014/main" id="{88C8E1DD-8EF5-2C65-5FE0-F4C6112F90F8}"/>
+              </a:ext>
+            </a:extLst>
+          </p:cNvPr>
+          <p:cNvSpPr/>
+          <p:nvPr/>
+        </p:nvSpPr>
+        <p:spPr>
+          <a:xfrm>
+            <a:off x="6576967" y="2603240"/>
+            <a:ext cx="1943100" cy="251944"/>
+          </a:xfrm>
+          <a:custGeom>
+            <a:avLst/>
+            <a:gdLst>
+              <a:gd name="connsiteX0" fmla="*/ 125860 w 1943100"/>
+              <a:gd name="connsiteY0" fmla="*/ 34150 h 251944"/>
+              <a:gd name="connsiteX1" fmla="*/ 34038 w 1943100"/>
+              <a:gd name="connsiteY1" fmla="*/ 125972 h 251944"/>
+              <a:gd name="connsiteX2" fmla="*/ 125860 w 1943100"/>
+              <a:gd name="connsiteY2" fmla="*/ 217794 h 251944"/>
+              <a:gd name="connsiteX3" fmla="*/ 1817240 w 1943100"/>
+              <a:gd name="connsiteY3" fmla="*/ 217794 h 251944"/>
+              <a:gd name="connsiteX4" fmla="*/ 1909062 w 1943100"/>
+              <a:gd name="connsiteY4" fmla="*/ 125972 h 251944"/>
+              <a:gd name="connsiteX5" fmla="*/ 1817240 w 1943100"/>
+              <a:gd name="connsiteY5" fmla="*/ 34150 h 251944"/>
+              <a:gd name="connsiteX6" fmla="*/ 125972 w 1943100"/>
+              <a:gd name="connsiteY6" fmla="*/ 0 h 251944"/>
+              <a:gd name="connsiteX7" fmla="*/ 1817128 w 1943100"/>
+              <a:gd name="connsiteY7" fmla="*/ 0 h 251944"/>
+              <a:gd name="connsiteX8" fmla="*/ 1943100 w 1943100"/>
+              <a:gd name="connsiteY8" fmla="*/ 125972 h 251944"/>
+              <a:gd name="connsiteX9" fmla="*/ 1817128 w 1943100"/>
+              <a:gd name="connsiteY9" fmla="*/ 251944 h 251944"/>
+              <a:gd name="connsiteX10" fmla="*/ 125972 w 1943100"/>
+              <a:gd name="connsiteY10" fmla="*/ 251944 h 251944"/>
+              <a:gd name="connsiteX11" fmla="*/ 0 w 1943100"/>
+              <a:gd name="connsiteY11" fmla="*/ 125972 h 251944"/>
+              <a:gd name="connsiteX12" fmla="*/ 125972 w 1943100"/>
+              <a:gd name="connsiteY12" fmla="*/ 0 h 251944"/>
+            </a:gdLst>
+            <a:ahLst/>
+            <a:cxnLst>
+              <a:cxn ang="0">
+                <a:pos x="connsiteX0" y="connsiteY0"/>
+              </a:cxn>
+              <a:cxn ang="0">
+                <a:pos x="connsiteX1" y="connsiteY1"/>
+              </a:cxn>
+              <a:cxn ang="0">
+                <a:pos x="connsiteX2" y="connsiteY2"/>
+              </a:cxn>
+              <a:cxn ang="0">
+                <a:pos x="connsiteX3" y="connsiteY3"/>
+              </a:cxn>
+              <a:cxn ang="0">
+                <a:pos x="connsiteX4" y="connsiteY4"/>
+              </a:cxn>
+              <a:cxn ang="0">
+                <a:pos x="connsiteX5" y="connsiteY5"/>
+              </a:cxn>
+              <a:cxn ang="0">
+                <a:pos x="connsiteX6" y="connsiteY6"/>
+              </a:cxn>
+              <a:cxn ang="0">
+                <a:pos x="connsiteX7" y="connsiteY7"/>
+              </a:cxn>
+              <a:cxn ang="0">
+                <a:pos x="connsiteX8" y="connsiteY8"/>
+              </a:cxn>
+              <a:cxn ang="0">
+                <a:pos x="connsiteX9" y="connsiteY9"/>
+              </a:cxn>
+              <a:cxn ang="0">
+                <a:pos x="connsiteX10" y="connsiteY10"/>
+              </a:cxn>
+              <a:cxn ang="0">
+                <a:pos x="connsiteX11" y="connsiteY11"/>
+              </a:cxn>
+              <a:cxn ang="0">
+                <a:pos x="connsiteX12" y="connsiteY12"/>
+              </a:cxn>
+            </a:cxnLst>
+            <a:rect l="l" t="t" r="r" b="b"/>
+            <a:pathLst>
+              <a:path w="1943100" h="251944">
+                <a:moveTo>
+                  <a:pt x="125860" y="34150"/>
+                </a:moveTo>
+                <a:cubicBezTo>
+                  <a:pt x="75148" y="34150"/>
+                  <a:pt x="34038" y="75260"/>
+                  <a:pt x="34038" y="125972"/>
+                </a:cubicBezTo>
+                <a:cubicBezTo>
+                  <a:pt x="34038" y="176684"/>
+                  <a:pt x="75148" y="217794"/>
+                  <a:pt x="125860" y="217794"/>
+                </a:cubicBezTo>
+                <a:lnTo>
+                  <a:pt x="1817240" y="217794"/>
+                </a:lnTo>
+                <a:cubicBezTo>
+                  <a:pt x="1867952" y="217794"/>
+                  <a:pt x="1909062" y="176684"/>
+                  <a:pt x="1909062" y="125972"/>
+                </a:cubicBezTo>
+                <a:cubicBezTo>
+                  <a:pt x="1909062" y="75260"/>
+                  <a:pt x="1867952" y="34150"/>
+                  <a:pt x="1817240" y="34150"/>
+                </a:cubicBezTo>
+                <a:close/>
+                <a:moveTo>
+                  <a:pt x="125972" y="0"/>
+                </a:moveTo>
+                <a:lnTo>
+                  <a:pt x="1817128" y="0"/>
+                </a:lnTo>
+                <a:cubicBezTo>
+                  <a:pt x="1886700" y="0"/>
+                  <a:pt x="1943100" y="56400"/>
+                  <a:pt x="1943100" y="125972"/>
+                </a:cubicBezTo>
+                <a:cubicBezTo>
+                  <a:pt x="1943100" y="195544"/>
+                  <a:pt x="1886700" y="251944"/>
+                  <a:pt x="1817128" y="251944"/>
+                </a:cubicBezTo>
+                <a:lnTo>
+                  <a:pt x="125972" y="251944"/>
+                </a:lnTo>
+                <a:cubicBezTo>
+                  <a:pt x="56400" y="251944"/>
+                  <a:pt x="0" y="195544"/>
+                  <a:pt x="0" y="125972"/>
+                </a:cubicBezTo>
+                <a:cubicBezTo>
+                  <a:pt x="0" y="56400"/>
+                  <a:pt x="56400" y="0"/>
+                  <a:pt x="125972" y="0"/>
+                </a:cubicBezTo>
+                <a:close/>
+              </a:path>
+            </a:pathLst>
+          </a:custGeom>
+          <a:solidFill>
+            <a:schemeClr val="bg1">
+              <a:lumMod val="75000"/>
+            </a:schemeClr>
+          </a:solidFill>
+          <a:ln w="12700">
+            <a:noFill/>
+          </a:ln>
+          <a:effectLst>
+            <a:outerShdw blurRad="50800" dist="38100" dir="2700000" algn="tl" rotWithShape="0">
+              <a:srgbClr val="7C8590">
+                <a:alpha val="40000"/>
+              </a:srgbClr>
+            </a:outerShdw>
+          </a:effectLst>
+        </p:spPr>
+        <p:style>
+          <a:lnRef idx="2">
+            <a:schemeClr val="accent1">
+              <a:shade val="15000"/>
+            </a:schemeClr>
+          </a:lnRef>
+          <a:fillRef idx="1">
+            <a:schemeClr val="accent1"/>
+          </a:fillRef>
+          <a:effectRef idx="0">
+            <a:schemeClr val="accent1"/>
+          </a:effectRef>
+          <a:fontRef idx="minor">
+            <a:schemeClr val="lt1"/>
+          </a:fontRef>
+        </p:style>
+        <p:txBody>
+          <a:bodyPr wrap="square" rtlCol="0" anchor="ctr">
+            <a:noAutofit/>
+          </a:bodyPr>
+          <a:lstStyle/>
+          <a:p>
+            <a:pPr algn="ctr"/>
+            <a:endParaRPr lang="zh-TW" altLang="en-US" dirty="0"/>
+          </a:p>
+        </p:txBody>
+      </p:sp>
+      <p:sp>
+        <p:nvSpPr>
+          <p:cNvPr id="45" name="矩形: 圓角 44">
+            <a:extLst>
+              <a:ext uri="{FF2B5EF4-FFF2-40B4-BE49-F238E27FC236}">
+                <a16:creationId xmlns:a16="http://schemas.microsoft.com/office/drawing/2014/main" id="{667C6833-A329-20D7-B552-F90D0E4D7190}"/>
+              </a:ext>
+            </a:extLst>
+          </p:cNvPr>
+          <p:cNvSpPr/>
+          <p:nvPr/>
+        </p:nvSpPr>
+        <p:spPr>
+          <a:xfrm>
+            <a:off x="3165341" y="4343430"/>
+            <a:ext cx="1234400" cy="294640"/>
+          </a:xfrm>
+          <a:prstGeom prst="roundRect">
+            <a:avLst>
+              <a:gd name="adj" fmla="val 50000"/>
+            </a:avLst>
+          </a:prstGeom>
+          <a:solidFill>
+            <a:srgbClr val="D9E2EF"/>
+          </a:solidFill>
+          <a:ln>
+            <a:solidFill>
+              <a:srgbClr val="BBCDE2"/>
+            </a:solidFill>
+          </a:ln>
+          <a:effectLst>
+            <a:outerShdw blurRad="76200" dist="38100" dir="2700000" algn="tl" rotWithShape="0">
+              <a:srgbClr val="A9BFDB"/>
+            </a:outerShdw>
+          </a:effectLst>
+        </p:spPr>
+        <p:style>
+          <a:lnRef idx="2">
+            <a:schemeClr val="accent1">
+              <a:shade val="15000"/>
+            </a:schemeClr>
+          </a:lnRef>
+          <a:fillRef idx="1">
+            <a:schemeClr val="accent1"/>
+          </a:fillRef>
+          <a:effectRef idx="0">
+            <a:schemeClr val="accent1"/>
+          </a:effectRef>
+          <a:fontRef idx="minor">
+            <a:schemeClr val="lt1"/>
+          </a:fontRef>
+        </p:style>
+        <p:txBody>
+          <a:bodyPr rtlCol="0" anchor="ctr"/>
+          <a:lstStyle/>
+          <a:p>
+            <a:pPr algn="ctr"/>
+            <a:endParaRPr lang="zh-TW" altLang="en-US"/>
+          </a:p>
+        </p:txBody>
+      </p:sp>
+      <p:sp>
+        <p:nvSpPr>
+          <p:cNvPr id="46" name="文字方塊 45">
+            <a:extLst>
+              <a:ext uri="{FF2B5EF4-FFF2-40B4-BE49-F238E27FC236}">
+                <a16:creationId xmlns:a16="http://schemas.microsoft.com/office/drawing/2014/main" id="{8DA20424-686F-7E7E-CB91-3F1C59B6A194}"/>
+              </a:ext>
+            </a:extLst>
+          </p:cNvPr>
+          <p:cNvSpPr txBox="1"/>
+          <p:nvPr/>
+        </p:nvSpPr>
+        <p:spPr>
+          <a:xfrm>
+            <a:off x="2964786" y="4782583"/>
+            <a:ext cx="1635510" cy="307777"/>
+          </a:xfrm>
+          <a:prstGeom prst="rect">
+            <a:avLst/>
+          </a:prstGeom>
+          <a:noFill/>
+        </p:spPr>
+        <p:txBody>
+          <a:bodyPr wrap="square" rtlCol="0">
+            <a:spAutoFit/>
+          </a:bodyPr>
+          <a:lstStyle/>
+          <a:p>
+            <a:r>
+              <a:rPr lang="en-US" altLang="zh-TW" sz="1400" dirty="0">
+                <a:latin typeface="Segoe UI" panose="020B0502040204020203" pitchFamily="34" charset="0"/>
+                <a:cs typeface="Segoe UI" panose="020B0502040204020203" pitchFamily="34" charset="0"/>
+              </a:rPr>
+              <a:t>Page Turn Hover 1</a:t>
+            </a:r>
+            <a:endParaRPr lang="zh-TW" altLang="en-US" sz="1400" dirty="0">
+              <a:latin typeface="Segoe UI" panose="020B0502040204020203" pitchFamily="34" charset="0"/>
+              <a:cs typeface="Segoe UI" panose="020B0502040204020203" pitchFamily="34" charset="0"/>
+            </a:endParaRPr>
+          </a:p>
+        </p:txBody>
+      </p:sp>
+      <p:sp>
+        <p:nvSpPr>
+          <p:cNvPr id="56" name="手繪多邊形: 圖案 55">
+            <a:extLst>
+              <a:ext uri="{FF2B5EF4-FFF2-40B4-BE49-F238E27FC236}">
+                <a16:creationId xmlns:a16="http://schemas.microsoft.com/office/drawing/2014/main" id="{4B1F00AF-E7D2-4009-8BF8-9CF60DB53484}"/>
+              </a:ext>
+            </a:extLst>
+          </p:cNvPr>
+          <p:cNvSpPr/>
+          <p:nvPr/>
+        </p:nvSpPr>
+        <p:spPr>
+          <a:xfrm>
+            <a:off x="3165341" y="5234873"/>
+            <a:ext cx="1234400" cy="294640"/>
+          </a:xfrm>
+          <a:custGeom>
+            <a:avLst/>
+            <a:gdLst>
+              <a:gd name="connsiteX0" fmla="*/ 153635 w 1234400"/>
+              <a:gd name="connsiteY0" fmla="*/ 39386 h 294640"/>
+              <a:gd name="connsiteX1" fmla="*/ 54182 w 1234400"/>
+              <a:gd name="connsiteY1" fmla="*/ 105308 h 294640"/>
+              <a:gd name="connsiteX2" fmla="*/ 45700 w 1234400"/>
+              <a:gd name="connsiteY2" fmla="*/ 147321 h 294640"/>
+              <a:gd name="connsiteX3" fmla="*/ 45700 w 1234400"/>
+              <a:gd name="connsiteY3" fmla="*/ 147320 h 294640"/>
+              <a:gd name="connsiteX4" fmla="*/ 45700 w 1234400"/>
+              <a:gd name="connsiteY4" fmla="*/ 147321 h 294640"/>
+              <a:gd name="connsiteX5" fmla="*/ 45700 w 1234400"/>
+              <a:gd name="connsiteY5" fmla="*/ 147321 h 294640"/>
+              <a:gd name="connsiteX6" fmla="*/ 54182 w 1234400"/>
+              <a:gd name="connsiteY6" fmla="*/ 189333 h 294640"/>
+              <a:gd name="connsiteX7" fmla="*/ 153635 w 1234400"/>
+              <a:gd name="connsiteY7" fmla="*/ 255255 h 294640"/>
+              <a:gd name="connsiteX8" fmla="*/ 1080765 w 1234400"/>
+              <a:gd name="connsiteY8" fmla="*/ 255256 h 294640"/>
+              <a:gd name="connsiteX9" fmla="*/ 1188700 w 1234400"/>
+              <a:gd name="connsiteY9" fmla="*/ 147321 h 294640"/>
+              <a:gd name="connsiteX10" fmla="*/ 1188701 w 1234400"/>
+              <a:gd name="connsiteY10" fmla="*/ 147321 h 294640"/>
+              <a:gd name="connsiteX11" fmla="*/ 1080766 w 1234400"/>
+              <a:gd name="connsiteY11" fmla="*/ 39386 h 294640"/>
+              <a:gd name="connsiteX12" fmla="*/ 147320 w 1234400"/>
+              <a:gd name="connsiteY12" fmla="*/ 0 h 294640"/>
+              <a:gd name="connsiteX13" fmla="*/ 1087080 w 1234400"/>
+              <a:gd name="connsiteY13" fmla="*/ 0 h 294640"/>
+              <a:gd name="connsiteX14" fmla="*/ 1234400 w 1234400"/>
+              <a:gd name="connsiteY14" fmla="*/ 147320 h 294640"/>
+              <a:gd name="connsiteX15" fmla="*/ 1087080 w 1234400"/>
+              <a:gd name="connsiteY15" fmla="*/ 294640 h 294640"/>
+              <a:gd name="connsiteX16" fmla="*/ 147320 w 1234400"/>
+              <a:gd name="connsiteY16" fmla="*/ 294640 h 294640"/>
+              <a:gd name="connsiteX17" fmla="*/ 0 w 1234400"/>
+              <a:gd name="connsiteY17" fmla="*/ 147320 h 294640"/>
+              <a:gd name="connsiteX18" fmla="*/ 147320 w 1234400"/>
+              <a:gd name="connsiteY18" fmla="*/ 0 h 294640"/>
+            </a:gdLst>
+            <a:ahLst/>
+            <a:cxnLst>
+              <a:cxn ang="0">
+                <a:pos x="connsiteX0" y="connsiteY0"/>
+              </a:cxn>
+              <a:cxn ang="0">
+                <a:pos x="connsiteX1" y="connsiteY1"/>
+              </a:cxn>
+              <a:cxn ang="0">
+                <a:pos x="connsiteX2" y="connsiteY2"/>
+              </a:cxn>
+              <a:cxn ang="0">
+                <a:pos x="connsiteX3" y="connsiteY3"/>
+              </a:cxn>
+              <a:cxn ang="0">
+                <a:pos x="connsiteX4" y="connsiteY4"/>
+              </a:cxn>
+              <a:cxn ang="0">
+                <a:pos x="connsiteX5" y="connsiteY5"/>
+              </a:cxn>
+              <a:cxn ang="0">
+                <a:pos x="connsiteX6" y="connsiteY6"/>
+              </a:cxn>
+              <a:cxn ang="0">
+                <a:pos x="connsiteX7" y="connsiteY7"/>
+              </a:cxn>
+              <a:cxn ang="0">
+                <a:pos x="connsiteX8" y="connsiteY8"/>
+              </a:cxn>
+              <a:cxn ang="0">
+                <a:pos x="connsiteX9" y="connsiteY9"/>
+              </a:cxn>
+              <a:cxn ang="0">
+                <a:pos x="connsiteX10" y="connsiteY10"/>
+              </a:cxn>
+              <a:cxn ang="0">
+                <a:pos x="connsiteX11" y="connsiteY11"/>
+              </a:cxn>
+              <a:cxn ang="0">
+                <a:pos x="connsiteX12" y="connsiteY12"/>
+              </a:cxn>
+              <a:cxn ang="0">
+                <a:pos x="connsiteX13" y="connsiteY13"/>
+              </a:cxn>
+              <a:cxn ang="0">
+                <a:pos x="connsiteX14" y="connsiteY14"/>
+              </a:cxn>
+              <a:cxn ang="0">
+                <a:pos x="connsiteX15" y="connsiteY15"/>
+              </a:cxn>
+              <a:cxn ang="0">
+                <a:pos x="connsiteX16" y="connsiteY16"/>
+              </a:cxn>
+              <a:cxn ang="0">
+                <a:pos x="connsiteX17" y="connsiteY17"/>
+              </a:cxn>
+              <a:cxn ang="0">
+                <a:pos x="connsiteX18" y="connsiteY18"/>
+              </a:cxn>
+            </a:cxnLst>
+            <a:rect l="l" t="t" r="r" b="b"/>
+            <a:pathLst>
+              <a:path w="1234400" h="294640">
+                <a:moveTo>
+                  <a:pt x="153635" y="39386"/>
+                </a:moveTo>
+                <a:cubicBezTo>
+                  <a:pt x="108927" y="39386"/>
+                  <a:pt x="70568" y="66569"/>
+                  <a:pt x="54182" y="105308"/>
+                </a:cubicBezTo>
+                <a:lnTo>
+                  <a:pt x="45700" y="147321"/>
+                </a:lnTo>
+                <a:lnTo>
+                  <a:pt x="45700" y="147320"/>
+                </a:lnTo>
+                <a:lnTo>
+                  <a:pt x="45700" y="147321"/>
+                </a:lnTo>
+                <a:lnTo>
+                  <a:pt x="45700" y="147321"/>
+                </a:lnTo>
+                <a:lnTo>
+                  <a:pt x="54182" y="189333"/>
+                </a:lnTo>
+                <a:cubicBezTo>
+                  <a:pt x="70568" y="228073"/>
+                  <a:pt x="108927" y="255255"/>
+                  <a:pt x="153635" y="255255"/>
+                </a:cubicBezTo>
+                <a:lnTo>
+                  <a:pt x="1080765" y="255256"/>
+                </a:lnTo>
+                <a:cubicBezTo>
+                  <a:pt x="1140376" y="255256"/>
+                  <a:pt x="1188700" y="206932"/>
+                  <a:pt x="1188700" y="147321"/>
+                </a:cubicBezTo>
+                <a:lnTo>
+                  <a:pt x="1188701" y="147321"/>
+                </a:lnTo>
+                <a:cubicBezTo>
+                  <a:pt x="1188701" y="87710"/>
+                  <a:pt x="1140377" y="39386"/>
+                  <a:pt x="1080766" y="39386"/>
+                </a:cubicBezTo>
+                <a:close/>
+                <a:moveTo>
+                  <a:pt x="147320" y="0"/>
+                </a:moveTo>
+                <a:lnTo>
+                  <a:pt x="1087080" y="0"/>
+                </a:lnTo>
+                <a:cubicBezTo>
+                  <a:pt x="1168443" y="0"/>
+                  <a:pt x="1234400" y="65957"/>
+                  <a:pt x="1234400" y="147320"/>
+                </a:cubicBezTo>
+                <a:cubicBezTo>
+                  <a:pt x="1234400" y="228683"/>
+                  <a:pt x="1168443" y="294640"/>
+                  <a:pt x="1087080" y="294640"/>
+                </a:cubicBezTo>
+                <a:lnTo>
+                  <a:pt x="147320" y="294640"/>
+                </a:lnTo>
+                <a:cubicBezTo>
+                  <a:pt x="65957" y="294640"/>
+                  <a:pt x="0" y="228683"/>
+                  <a:pt x="0" y="147320"/>
+                </a:cubicBezTo>
+                <a:cubicBezTo>
+                  <a:pt x="0" y="65957"/>
+                  <a:pt x="65957" y="0"/>
+                  <a:pt x="147320" y="0"/>
+                </a:cubicBezTo>
+                <a:close/>
+              </a:path>
+            </a:pathLst>
+          </a:custGeom>
+          <a:solidFill>
+            <a:schemeClr val="bg1">
+              <a:lumMod val="95000"/>
+            </a:schemeClr>
+          </a:solidFill>
+          <a:ln>
+            <a:noFill/>
+          </a:ln>
+          <a:effectLst>
+            <a:outerShdw blurRad="76200" dist="38100" dir="2700000" algn="tl" rotWithShape="0">
+              <a:srgbClr val="A9BFDB"/>
+            </a:outerShdw>
+          </a:effectLst>
+        </p:spPr>
+        <p:style>
+          <a:lnRef idx="2">
+            <a:schemeClr val="accent1">
+              <a:shade val="15000"/>
+            </a:schemeClr>
+          </a:lnRef>
+          <a:fillRef idx="1">
+            <a:schemeClr val="accent1"/>
+          </a:fillRef>
+          <a:effectRef idx="0">
+            <a:schemeClr val="accent1"/>
+          </a:effectRef>
+          <a:fontRef idx="minor">
+            <a:schemeClr val="lt1"/>
+          </a:fontRef>
+        </p:style>
+        <p:txBody>
+          <a:bodyPr wrap="square" rtlCol="0" anchor="ctr">
+            <a:noAutofit/>
+          </a:bodyPr>
+          <a:lstStyle/>
+          <a:p>
+            <a:pPr algn="ctr"/>
+            <a:endParaRPr lang="zh-TW" altLang="en-US"/>
+          </a:p>
+        </p:txBody>
+      </p:sp>
+      <p:sp>
+        <p:nvSpPr>
+          <p:cNvPr id="61" name="文字方塊 60">
+            <a:extLst>
+              <a:ext uri="{FF2B5EF4-FFF2-40B4-BE49-F238E27FC236}">
+                <a16:creationId xmlns:a16="http://schemas.microsoft.com/office/drawing/2014/main" id="{5EA4E6FA-B46B-85C9-56AB-CA8EA35A459E}"/>
+              </a:ext>
+            </a:extLst>
+          </p:cNvPr>
+          <p:cNvSpPr txBox="1"/>
+          <p:nvPr/>
+        </p:nvSpPr>
+        <p:spPr>
+          <a:xfrm>
+            <a:off x="2964786" y="5674028"/>
+            <a:ext cx="1635510" cy="307777"/>
+          </a:xfrm>
+          <a:prstGeom prst="rect">
+            <a:avLst/>
+          </a:prstGeom>
+          <a:noFill/>
+        </p:spPr>
+        <p:txBody>
+          <a:bodyPr wrap="square" rtlCol="0">
+            <a:spAutoFit/>
+          </a:bodyPr>
+          <a:lstStyle/>
+          <a:p>
+            <a:r>
+              <a:rPr lang="en-US" altLang="zh-TW" sz="1400" dirty="0">
+                <a:latin typeface="Segoe UI" panose="020B0502040204020203" pitchFamily="34" charset="0"/>
+                <a:cs typeface="Segoe UI" panose="020B0502040204020203" pitchFamily="34" charset="0"/>
+              </a:rPr>
+              <a:t>Page Turn Hover 2</a:t>
+            </a:r>
+            <a:endParaRPr lang="zh-TW" altLang="en-US" sz="1400" dirty="0">
+              <a:latin typeface="Segoe UI" panose="020B0502040204020203" pitchFamily="34" charset="0"/>
+              <a:cs typeface="Segoe UI" panose="020B0502040204020203" pitchFamily="34" charset="0"/>
+            </a:endParaRPr>
+          </a:p>
+        </p:txBody>
+      </p:sp>
+    </p:spTree>
+    <p:custDataLst>
+      <p:tags r:id="rId1"/>
+    </p:custDataLst>
+    <p:extLst>
+      <p:ext uri="{BB962C8B-B14F-4D97-AF65-F5344CB8AC3E}">
+        <p14:creationId xmlns:p14="http://schemas.microsoft.com/office/powerpoint/2010/main" val="957135934"/>
+      </p:ext>
+    </p:extLst>
+  </p:cSld>
+  <p:clrMapOvr>
+    <a:masterClrMapping/>
+  </p:clrMapOvr>
+</p:sld>
+</file>
+
 <file path=ppt/slides/slide2.xml><?xml version="1.0" encoding="utf-8"?>
 <p:sld xmlns:a="http://schemas.openxmlformats.org/drawingml/2006/main" xmlns:r="http://schemas.openxmlformats.org/officeDocument/2006/relationships" xmlns:p="http://schemas.openxmlformats.org/presentationml/2006/main">
   <p:cSld>
@@ -27997,6 +29323,12 @@
 </file>
 
 <file path=ppt/tags/tag1.xml><?xml version="1.0" encoding="utf-8"?>
+<p:tagLst xmlns:a="http://schemas.openxmlformats.org/drawingml/2006/main" xmlns:r="http://schemas.openxmlformats.org/officeDocument/2006/relationships" xmlns:p="http://schemas.openxmlformats.org/presentationml/2006/main">
+  <p:tag name="AMA" val="3.0"/>
+</p:tagLst>
+</file>
+
+<file path=ppt/tags/tag10.xml><?xml version="1.0" encoding="utf-8"?>
 <p:tagLst xmlns:a="http://schemas.openxmlformats.org/drawingml/2006/main" xmlns:r="http://schemas.openxmlformats.org/officeDocument/2006/relationships" xmlns:p="http://schemas.openxmlformats.org/presentationml/2006/main">
   <p:tag name="AMA" val="3.0"/>
 </p:tagLst>

</xml_diff>